<commit_message>
Minor fixes on slides
</commit_message>
<xml_diff>
--- a/Courses/Computer-Modeling-and-IT/Computer-Modeling-and-IT-5-Class/02-User-Interface/02-User-Interface.pptx
+++ b/Courses/Computer-Modeling-and-IT/Computer-Modeling-and-IT-5-Class/02-User-Interface/02-User-Interface.pptx
@@ -293,7 +293,7 @@
           <a:p>
             <a:fld id="{4E087215-0C8F-4762-A664-737A353EC9A4}" type="datetimeFigureOut">
               <a:rPr lang="bg-BG" smtClean="0"/>
-              <a:t>23.2.2024 г.</a:t>
+              <a:t>27.02.24 г.</a:t>
             </a:fld>
             <a:endParaRPr lang="bg-BG"/>
           </a:p>
@@ -489,7 +489,7 @@
           <a:p>
             <a:fld id="{72D84649-876A-46C9-8472-14CB09C070D8}" type="datetimeFigureOut">
               <a:rPr lang="en-US" smtClean="0"/>
-              <a:t>2/23/2024</a:t>
+              <a:t>2/27/24</a:t>
             </a:fld>
             <a:endParaRPr lang="en-US"/>
           </a:p>
@@ -7230,13 +7230,13 @@
         </p:nvSpPr>
         <p:spPr>
           <a:xfrm>
-            <a:off x="630068" y="1474404"/>
-            <a:ext cx="10965303" cy="882654"/>
+            <a:off x="630068" y="1646346"/>
+            <a:ext cx="10965303" cy="612654"/>
           </a:xfrm>
         </p:spPr>
         <p:txBody>
           <a:bodyPr>
-            <a:normAutofit/>
+            <a:normAutofit lnSpcReduction="10000"/>
           </a:bodyPr>
           <a:lstStyle/>
           <a:p>
@@ -7266,8 +7266,8 @@
         </p:nvSpPr>
         <p:spPr>
           <a:xfrm>
-            <a:off x="236918" y="446261"/>
-            <a:ext cx="11283094" cy="882654"/>
+            <a:off x="454453" y="348203"/>
+            <a:ext cx="11283094" cy="1186404"/>
           </a:xfrm>
         </p:spPr>
         <p:txBody>
@@ -7496,26 +7496,34 @@
           <p:nvPr/>
         </p:nvPicPr>
         <p:blipFill>
-          <a:blip r:embed="rId2"/>
-          <a:stretch>
-            <a:fillRect/>
-          </a:stretch>
+          <a:blip r:embed="rId2">
+            <a:extLst>
+              <a:ext uri="{28A0092B-C50C-407E-A947-70E740481C1C}">
+                <a14:useLocalDpi xmlns:a14="http://schemas.microsoft.com/office/drawing/2010/main" val="0"/>
+              </a:ext>
+            </a:extLst>
+          </a:blip>
+          <a:srcRect/>
+          <a:stretch/>
         </p:blipFill>
         <p:spPr>
           <a:xfrm>
-            <a:off x="3081000" y="729000"/>
-            <a:ext cx="6161524" cy="3723041"/>
+            <a:off x="2835933" y="304398"/>
+            <a:ext cx="6520133" cy="4474602"/>
           </a:xfrm>
           <a:prstGeom prst="rect">
             <a:avLst/>
           </a:prstGeom>
           <a:ln>
-            <a:solidFill>
-              <a:schemeClr val="bg2">
-                <a:lumMod val="75000"/>
-              </a:schemeClr>
-            </a:solidFill>
+            <a:noFill/>
           </a:ln>
+          <a:effectLst>
+            <a:outerShdw blurRad="292100" dist="139700" dir="2700000" algn="tl" rotWithShape="0">
+              <a:srgbClr val="333333">
+                <a:alpha val="65000"/>
+              </a:srgbClr>
+            </a:outerShdw>
+          </a:effectLst>
         </p:spPr>
       </p:pic>
       <p:sp>
@@ -7530,8 +7538,8 @@
         </p:nvSpPr>
         <p:spPr>
           <a:xfrm>
-            <a:off x="615109" y="4704824"/>
-            <a:ext cx="10961783" cy="1109175"/>
+            <a:off x="313500" y="5049000"/>
+            <a:ext cx="11565000" cy="855000"/>
           </a:xfrm>
         </p:spPr>
         <p:txBody>
@@ -7539,10 +7547,10 @@
           <a:lstStyle/>
           <a:p>
             <a:r>
-              <a:rPr lang="bg-BG" dirty="0" smtClean="0"/>
+              <a:rPr lang="bg-BG" sz="4800" dirty="0"/>
               <a:t>Елементи на диалоговите прозорците</a:t>
             </a:r>
-            <a:endParaRPr lang="en-US" dirty="0"/>
+            <a:endParaRPr lang="en-US" sz="4800" dirty="0"/>
           </a:p>
         </p:txBody>
       </p:sp>
@@ -7558,7 +7566,7 @@
         </p:nvSpPr>
         <p:spPr>
           <a:xfrm>
-            <a:off x="615109" y="5949000"/>
+            <a:off x="615107" y="5907084"/>
             <a:ext cx="10961783" cy="768084"/>
           </a:xfrm>
         </p:spPr>
@@ -7567,7 +7575,7 @@
           <a:lstStyle/>
           <a:p>
             <a:r>
-              <a:rPr lang="ru-RU" dirty="0" smtClean="0"/>
+              <a:rPr lang="ru-RU" dirty="0"/>
               <a:t>Радиобутон, текстово поле, отметка, бутон</a:t>
             </a:r>
             <a:endParaRPr lang="en-US" dirty="0"/>
@@ -7592,13 +7600,6 @@
       <p:transition spd="slow" advClick="0" advTm="5000"/>
     </mc:Fallback>
   </mc:AlternateContent>
-  <p:timing>
-    <p:tnLst>
-      <p:par>
-        <p:cTn id="1" dur="indefinite" restart="never" nodeType="tmRoot"/>
-      </p:par>
-    </p:tnLst>
-  </p:timing>
 </p:sld>
 </file>
 
@@ -7661,7 +7662,7 @@
         </p:nvSpPr>
         <p:spPr>
           <a:xfrm>
-            <a:off x="12700" y="112325"/>
+            <a:off x="132729" y="112325"/>
             <a:ext cx="9833271" cy="882654"/>
           </a:xfrm>
         </p:spPr>
@@ -7935,7 +7936,10 @@
             <a:r>
               <a:rPr lang="en-US" sz="2800" b="1" dirty="0">
                 <a:solidFill>
-                  <a:schemeClr val="accent1"/>
+                  <a:schemeClr val="bg1">
+                    <a:lumMod val="60000"/>
+                    <a:lumOff val="40000"/>
+                  </a:schemeClr>
                 </a:solidFill>
                 <a:effectLst>
                   <a:outerShdw blurRad="38100" dist="38100" dir="2700000" algn="tl">
@@ -9042,7 +9046,7 @@
           </a:xfrm>
           <a:prstGeom prst="wedgeRoundRectCallout">
             <a:avLst>
-              <a:gd name="adj1" fmla="val -154226"/>
+              <a:gd name="adj1" fmla="val -162484"/>
               <a:gd name="adj2" fmla="val -28112"/>
               <a:gd name="adj3" fmla="val 16667"/>
             </a:avLst>
@@ -9089,7 +9093,7 @@
           <a:p>
             <a:pPr algn="ctr"/>
             <a:r>
-              <a:rPr lang="bg-BG" sz="2800" b="1" dirty="0" smtClean="0">
+              <a:rPr lang="bg-BG" sz="2800" b="1" dirty="0">
                 <a:solidFill>
                   <a:srgbClr val="FFFFFF"/>
                 </a:solidFill>
@@ -9103,18 +9107,6 @@
               </a:rPr>
               <a:t>Радиобутон</a:t>
             </a:r>
-            <a:endParaRPr lang="bg-BG" sz="2800" b="1" dirty="0">
-              <a:solidFill>
-                <a:srgbClr val="FFFFFF"/>
-              </a:solidFill>
-              <a:effectLst>
-                <a:outerShdw blurRad="38100" dist="38100" dir="2700000" algn="tl">
-                  <a:srgbClr val="000000">
-                    <a:alpha val="43137"/>
-                  </a:srgbClr>
-                </a:outerShdw>
-              </a:effectLst>
-            </a:endParaRPr>
           </a:p>
         </p:txBody>
       </p:sp>
@@ -9607,7 +9599,7 @@
             </a:r>
             <a:r>
               <a:rPr lang="bg-BG" b="1" dirty="0"/>
-              <a:t>десен бутон</a:t>
+              <a:t>десния бутон</a:t>
             </a:r>
             <a:r>
               <a:rPr lang="bg-BG" dirty="0"/>
@@ -9700,7 +9692,7 @@
         <p:spPr>
           <a:xfrm>
             <a:off x="8539089" y="4773284"/>
-            <a:ext cx="2700997" cy="1671235"/>
+            <a:ext cx="2918341" cy="1805716"/>
           </a:xfrm>
           <a:prstGeom prst="rect">
             <a:avLst/>
@@ -9730,8 +9722,8 @@
         </p:blipFill>
         <p:spPr>
           <a:xfrm>
-            <a:off x="8539088" y="1458410"/>
-            <a:ext cx="2700997" cy="2980483"/>
+            <a:off x="8539088" y="1275328"/>
+            <a:ext cx="2866912" cy="3163566"/>
           </a:xfrm>
           <a:prstGeom prst="rect">
             <a:avLst/>
@@ -9976,16 +9968,15 @@
           </p:cNvPicPr>
           <p:nvPr/>
         </p:nvPicPr>
-        <p:blipFill>
+        <p:blipFill rotWithShape="1">
           <a:blip r:embed="rId2"/>
-          <a:stretch>
-            <a:fillRect/>
-          </a:stretch>
+          <a:srcRect l="6416" t="2489" r="16933" b="1659"/>
+          <a:stretch/>
         </p:blipFill>
         <p:spPr>
           <a:xfrm>
-            <a:off x="7201770" y="1775448"/>
-            <a:ext cx="4154885" cy="2341456"/>
+            <a:off x="7656319" y="1424829"/>
+            <a:ext cx="3865656" cy="2724171"/>
           </a:xfrm>
           <a:prstGeom prst="rect">
             <a:avLst/>
@@ -10183,7 +10174,7 @@
         </p:blipFill>
         <p:spPr>
           <a:xfrm>
-            <a:off x="7201770" y="4696227"/>
+            <a:off x="7201770" y="5099044"/>
             <a:ext cx="4154885" cy="1510868"/>
           </a:xfrm>
           <a:prstGeom prst="rect">
@@ -10237,7 +10228,7 @@
                             </p:stCondLst>
                             <p:childTnLst>
                               <p:par>
-                                <p:cTn id="5" presetID="1" presetClass="entr" presetSubtype="0" fill="hold" grpId="0" nodeType="clickEffect">
+                                <p:cTn id="5" presetID="1" presetClass="entr" presetSubtype="0" fill="hold" nodeType="clickEffect">
                                   <p:stCondLst>
                                     <p:cond delay="0"/>
                                   </p:stCondLst>
@@ -10252,7 +10243,7 @@
                                         <p:tgtEl>
                                           <p:spTgt spid="5">
                                             <p:txEl>
-                                              <p:pRg st="2" end="2"/>
+                                              <p:pRg st="1" end="1"/>
                                             </p:txEl>
                                           </p:spTgt>
                                         </p:tgtEl>
@@ -10301,6 +10292,55 @@
                                         <p:tgtEl>
                                           <p:spTgt spid="5">
                                             <p:txEl>
+                                              <p:pRg st="2" end="2"/>
+                                            </p:txEl>
+                                          </p:spTgt>
+                                        </p:tgtEl>
+                                        <p:attrNameLst>
+                                          <p:attrName>style.visibility</p:attrName>
+                                        </p:attrNameLst>
+                                      </p:cBhvr>
+                                      <p:to>
+                                        <p:strVal val="visible"/>
+                                      </p:to>
+                                    </p:set>
+                                  </p:childTnLst>
+                                </p:cTn>
+                              </p:par>
+                            </p:childTnLst>
+                          </p:cTn>
+                        </p:par>
+                      </p:childTnLst>
+                    </p:cTn>
+                  </p:par>
+                  <p:par>
+                    <p:cTn id="11" fill="hold">
+                      <p:stCondLst>
+                        <p:cond delay="indefinite"/>
+                      </p:stCondLst>
+                      <p:childTnLst>
+                        <p:par>
+                          <p:cTn id="12" fill="hold">
+                            <p:stCondLst>
+                              <p:cond delay="0"/>
+                            </p:stCondLst>
+                            <p:childTnLst>
+                              <p:par>
+                                <p:cTn id="13" presetID="1" presetClass="entr" presetSubtype="0" fill="hold" grpId="0" nodeType="clickEffect">
+                                  <p:stCondLst>
+                                    <p:cond delay="0"/>
+                                  </p:stCondLst>
+                                  <p:childTnLst>
+                                    <p:set>
+                                      <p:cBhvr>
+                                        <p:cTn id="14" dur="1" fill="hold">
+                                          <p:stCondLst>
+                                            <p:cond delay="0"/>
+                                          </p:stCondLst>
+                                        </p:cTn>
+                                        <p:tgtEl>
+                                          <p:spTgt spid="5">
+                                            <p:txEl>
                                               <p:pRg st="3" end="3"/>
                                             </p:txEl>
                                           </p:spTgt>
@@ -10317,14 +10357,14 @@
                                 </p:cTn>
                               </p:par>
                               <p:par>
-                                <p:cTn id="11" presetID="1" presetClass="entr" presetSubtype="0" fill="hold" nodeType="withEffect">
+                                <p:cTn id="15" presetID="1" presetClass="entr" presetSubtype="0" fill="hold" nodeType="withEffect">
                                   <p:stCondLst>
                                     <p:cond delay="0"/>
                                   </p:stCondLst>
                                   <p:childTnLst>
                                     <p:set>
                                       <p:cBhvr>
-                                        <p:cTn id="12" dur="1" fill="hold">
+                                        <p:cTn id="16" dur="1" fill="hold">
                                           <p:stCondLst>
                                             <p:cond delay="0"/>
                                           </p:stCondLst>
@@ -10516,8 +10556,8 @@
           </a:xfrm>
           <a:prstGeom prst="wedgeRoundRectCallout">
             <a:avLst>
-              <a:gd name="adj1" fmla="val 62669"/>
-              <a:gd name="adj2" fmla="val 101705"/>
+              <a:gd name="adj1" fmla="val 65297"/>
+              <a:gd name="adj2" fmla="val 79876"/>
               <a:gd name="adj3" fmla="val 16667"/>
             </a:avLst>
           </a:prstGeom>
@@ -10678,7 +10718,14 @@
             </a:avLst>
           </a:prstGeom>
           <a:noFill/>
-          <a:ln w="38100"/>
+          <a:ln w="38100">
+            <a:solidFill>
+              <a:schemeClr val="bg1">
+                <a:lumMod val="60000"/>
+                <a:lumOff val="40000"/>
+              </a:schemeClr>
+            </a:solidFill>
+          </a:ln>
         </p:spPr>
         <p:style>
           <a:lnRef idx="2">
@@ -10706,7 +10753,10 @@
             <a:pPr algn="ctr"/>
             <a:endParaRPr lang="bg-BG" sz="2800" b="1" dirty="0">
               <a:solidFill>
-                <a:srgbClr val="FFFFFF"/>
+                <a:schemeClr val="bg1">
+                  <a:lumMod val="60000"/>
+                  <a:lumOff val="40000"/>
+                </a:schemeClr>
               </a:solidFill>
               <a:effectLst>
                 <a:outerShdw blurRad="38100" dist="38100" dir="2700000" algn="tl">
@@ -12378,7 +12428,7 @@
                 <a:hlinkClick r:id="rId3">
                   <a:extLst>
                     <a:ext uri="{A12FA001-AC4F-418D-AE19-62706E023703}">
-                      <ahyp:hlinkClr xmlns="" xmlns:ahyp="http://schemas.microsoft.com/office/drawing/2018/hyperlinkcolor" val="tx"/>
+                      <ahyp:hlinkClr xmlns:ahyp="http://schemas.microsoft.com/office/drawing/2018/hyperlinkcolor" val="tx"/>
                     </a:ext>
                   </a:extLst>
                 </a:hlinkClick>
@@ -12451,13 +12501,6 @@
       <p:transition spd="slow" advClick="0" advTm="5000"/>
     </mc:Fallback>
   </mc:AlternateContent>
-  <p:timing>
-    <p:tnLst>
-      <p:par>
-        <p:cTn id="1" dur="indefinite" restart="never" nodeType="tmRoot"/>
-      </p:par>
-    </p:tnLst>
-  </p:timing>
 </p:sld>
 </file>
 
@@ -12841,13 +12884,6 @@
       <p:transition spd="slow" advClick="0" advTm="5000"/>
     </mc:Fallback>
   </mc:AlternateContent>
-  <p:timing>
-    <p:tnLst>
-      <p:par>
-        <p:cTn id="1" dur="indefinite" restart="never" nodeType="tmRoot"/>
-      </p:par>
-    </p:tnLst>
-  </p:timing>
 </p:sld>
 </file>
 
@@ -13426,16 +13462,21 @@
             <p:ph type="title" sz="quarter" idx="10"/>
           </p:nvPr>
         </p:nvSpPr>
-        <p:spPr/>
+        <p:spPr>
+          <a:xfrm>
+            <a:off x="615109" y="4775916"/>
+            <a:ext cx="10961783" cy="768084"/>
+          </a:xfrm>
+        </p:spPr>
         <p:txBody>
           <a:bodyPr/>
           <a:lstStyle/>
           <a:p>
             <a:r>
-              <a:rPr lang="bg-BG" smtClean="0"/>
+              <a:rPr lang="bg-BG" dirty="0"/>
               <a:t>Как общуваме с компютъра?</a:t>
             </a:r>
-            <a:endParaRPr lang="en-US"/>
+            <a:endParaRPr lang="en-US" dirty="0"/>
           </a:p>
         </p:txBody>
       </p:sp>
@@ -13462,12 +13503,15 @@
             <a:avLst/>
           </a:prstGeom>
           <a:ln>
-            <a:solidFill>
-              <a:schemeClr val="bg2">
-                <a:lumMod val="75000"/>
-              </a:schemeClr>
-            </a:solidFill>
+            <a:noFill/>
           </a:ln>
+          <a:effectLst>
+            <a:outerShdw blurRad="292100" dist="139700" dir="2700000" algn="tl" rotWithShape="0">
+              <a:srgbClr val="333333">
+                <a:alpha val="65000"/>
+              </a:srgbClr>
+            </a:outerShdw>
+          </a:effectLst>
         </p:spPr>
       </p:pic>
       <p:sp>
@@ -13480,16 +13524,21 @@
             <p:ph type="subTitle" sz="quarter" idx="11"/>
           </p:nvPr>
         </p:nvSpPr>
-        <p:spPr/>
+        <p:spPr>
+          <a:xfrm>
+            <a:off x="615109" y="5630916"/>
+            <a:ext cx="10961783" cy="768084"/>
+          </a:xfrm>
+        </p:spPr>
         <p:txBody>
           <a:bodyPr/>
           <a:lstStyle/>
           <a:p>
             <a:r>
-              <a:rPr lang="bg-BG" smtClean="0"/>
+              <a:rPr lang="bg-BG" dirty="0"/>
               <a:t>Операционна система и интерфейс</a:t>
             </a:r>
-            <a:endParaRPr lang="en-US"/>
+            <a:endParaRPr lang="en-US" dirty="0"/>
           </a:p>
         </p:txBody>
       </p:sp>
@@ -13511,13 +13560,6 @@
       <p:transition spd="slow" advClick="0" advTm="5000"/>
     </mc:Fallback>
   </mc:AlternateContent>
-  <p:timing>
-    <p:tnLst>
-      <p:par>
-        <p:cTn id="1" dur="indefinite" restart="never" nodeType="tmRoot"/>
-      </p:par>
-    </p:tnLst>
-  </p:timing>
 </p:sld>
 </file>
 
@@ -13963,7 +14005,7 @@
           <a:lstStyle/>
           <a:p>
             <a:r>
-              <a:rPr lang="bg-BG" smtClean="0"/>
+              <a:rPr lang="bg-BG"/>
               <a:t>Елементи на началния екран</a:t>
             </a:r>
             <a:endParaRPr lang="en-US"/>
@@ -13993,12 +14035,15 @@
             <a:avLst/>
           </a:prstGeom>
           <a:ln>
-            <a:solidFill>
-              <a:schemeClr val="bg2">
-                <a:lumMod val="75000"/>
-              </a:schemeClr>
-            </a:solidFill>
+            <a:noFill/>
           </a:ln>
+          <a:effectLst>
+            <a:outerShdw blurRad="292100" dist="139700" dir="2700000" algn="tl" rotWithShape="0">
+              <a:srgbClr val="333333">
+                <a:alpha val="65000"/>
+              </a:srgbClr>
+            </a:outerShdw>
+          </a:effectLst>
         </p:spPr>
       </p:pic>
       <p:sp>
@@ -14017,7 +14062,7 @@
           <a:lstStyle/>
           <a:p>
             <a:r>
-              <a:rPr lang="ru-RU" smtClean="0"/>
+              <a:rPr lang="ru-RU"/>
               <a:t>Работен плот и лента на задачите</a:t>
             </a:r>
             <a:endParaRPr lang="en-US"/>
@@ -14042,13 +14087,6 @@
       <p:transition spd="slow" advClick="0" advTm="5000"/>
     </mc:Fallback>
   </mc:AlternateContent>
-  <p:timing>
-    <p:tnLst>
-      <p:par>
-        <p:cTn id="1" dur="indefinite" restart="never" nodeType="tmRoot"/>
-      </p:par>
-    </p:tnLst>
-  </p:timing>
 </p:sld>
 </file>
 
@@ -14151,8 +14189,8 @@
           </a:xfrm>
           <a:prstGeom prst="wedgeRoundRectCallout">
             <a:avLst>
-              <a:gd name="adj1" fmla="val -48433"/>
-              <a:gd name="adj2" fmla="val 111357"/>
+              <a:gd name="adj1" fmla="val -44083"/>
+              <a:gd name="adj2" fmla="val 113141"/>
               <a:gd name="adj3" fmla="val 16667"/>
             </a:avLst>
           </a:prstGeom>
@@ -14336,8 +14374,8 @@
         </p:nvSpPr>
         <p:spPr bwMode="auto">
           <a:xfrm>
-            <a:off x="105192" y="3762295"/>
-            <a:ext cx="2177894" cy="677819"/>
+            <a:off x="105192" y="3834000"/>
+            <a:ext cx="2177894" cy="606114"/>
           </a:xfrm>
           <a:prstGeom prst="wedgeRoundRectCallout">
             <a:avLst>
@@ -14942,12 +14980,15 @@
             <a:avLst/>
           </a:prstGeom>
           <a:ln>
-            <a:solidFill>
-              <a:schemeClr val="bg2">
-                <a:lumMod val="75000"/>
-              </a:schemeClr>
-            </a:solidFill>
+            <a:noFill/>
           </a:ln>
+          <a:effectLst>
+            <a:outerShdw blurRad="292100" dist="139700" dir="2700000" algn="tl" rotWithShape="0">
+              <a:srgbClr val="333333">
+                <a:alpha val="65000"/>
+              </a:srgbClr>
+            </a:outerShdw>
+          </a:effectLst>
         </p:spPr>
       </p:pic>
       <p:sp>
@@ -14966,7 +15007,7 @@
           <a:lstStyle/>
           <a:p>
             <a:r>
-              <a:rPr lang="bg-BG" smtClean="0"/>
+              <a:rPr lang="bg-BG"/>
               <a:t>Основни елементи на прозорците</a:t>
             </a:r>
             <a:endParaRPr lang="en-US"/>
@@ -14983,16 +15024,21 @@
             <p:ph type="subTitle" sz="quarter" idx="11"/>
           </p:nvPr>
         </p:nvSpPr>
-        <p:spPr/>
+        <p:spPr>
+          <a:xfrm>
+            <a:off x="138054" y="5512139"/>
+            <a:ext cx="11915891" cy="954000"/>
+          </a:xfrm>
+        </p:spPr>
         <p:txBody>
           <a:bodyPr/>
           <a:lstStyle/>
           <a:p>
             <a:r>
-              <a:rPr lang="ru-RU" smtClean="0"/>
+              <a:rPr lang="ru-RU" sz="3800" dirty="0"/>
               <a:t>Менюта, ленти, бутони, плъзгачи, области и екрани </a:t>
             </a:r>
-            <a:endParaRPr lang="en-US"/>
+            <a:endParaRPr lang="en-US" sz="3800" dirty="0"/>
           </a:p>
         </p:txBody>
       </p:sp>
@@ -15014,13 +15060,6 @@
       <p:transition spd="slow" advClick="0" advTm="5000"/>
     </mc:Fallback>
   </mc:AlternateContent>
-  <p:timing>
-    <p:tnLst>
-      <p:par>
-        <p:cTn id="1" dur="indefinite" restart="never" nodeType="tmRoot"/>
-      </p:par>
-    </p:tnLst>
-  </p:timing>
 </p:sld>
 </file>
 
@@ -15097,7 +15136,15 @@
           <a:p>
             <a:r>
               <a:rPr lang="bg-BG" dirty="0"/>
-              <a:t>Основни елементи на прозореца(1)</a:t>
+              <a:t>Основни елементи на прозореца</a:t>
+            </a:r>
+            <a:r>
+              <a:rPr lang="en-US" dirty="0"/>
+              <a:t> </a:t>
+            </a:r>
+            <a:r>
+              <a:rPr lang="bg-BG" dirty="0"/>
+              <a:t>(1)</a:t>
             </a:r>
           </a:p>
         </p:txBody>
@@ -15115,8 +15162,8 @@
           </a:xfrm>
           <a:prstGeom prst="wedgeRoundRectCallout">
             <a:avLst>
-              <a:gd name="adj1" fmla="val 63099"/>
-              <a:gd name="adj2" fmla="val 35991"/>
+              <a:gd name="adj1" fmla="val 110953"/>
+              <a:gd name="adj2" fmla="val 50723"/>
               <a:gd name="adj3" fmla="val 16667"/>
             </a:avLst>
           </a:prstGeom>
@@ -15269,8 +15316,8 @@
           </a:xfrm>
           <a:prstGeom prst="wedgeRoundRectCallout">
             <a:avLst>
-              <a:gd name="adj1" fmla="val 81547"/>
-              <a:gd name="adj2" fmla="val -27310"/>
+              <a:gd name="adj1" fmla="val 85731"/>
+              <a:gd name="adj2" fmla="val -29279"/>
               <a:gd name="adj3" fmla="val 16667"/>
             </a:avLst>
           </a:prstGeom>
@@ -16115,8 +16162,8 @@
         </p:nvSpPr>
         <p:spPr bwMode="auto">
           <a:xfrm>
-            <a:off x="7949022" y="2649454"/>
-            <a:ext cx="3494859" cy="1047702"/>
+            <a:off x="7806000" y="2741298"/>
+            <a:ext cx="4185000" cy="1047702"/>
           </a:xfrm>
           <a:prstGeom prst="wedgeRoundRectCallout">
             <a:avLst>
@@ -16179,7 +16226,7 @@
                   </a:outerShdw>
                 </a:effectLst>
               </a:rPr>
-              <a:t>Показва прозореца на </a:t>
+              <a:t>Показване на прозореца на </a:t>
             </a:r>
             <a:r>
               <a:rPr lang="bg-BG" sz="2800" b="1" dirty="0">
@@ -16197,7 +16244,7 @@
                   </a:outerShdw>
                 </a:effectLst>
               </a:rPr>
-              <a:t>целия екран</a:t>
+              <a:t>цял екран</a:t>
             </a:r>
           </a:p>
         </p:txBody>
@@ -16373,6 +16420,194 @@
               <a:t>9</a:t>
             </a:fld>
             <a:endParaRPr lang="en-US" noProof="0" dirty="0"/>
+          </a:p>
+        </p:txBody>
+      </p:sp>
+      <p:sp>
+        <p:nvSpPr>
+          <p:cNvPr id="2" name="Закръглено правоъгълно изнесено означение 20">
+            <a:extLst>
+              <a:ext uri="{FF2B5EF4-FFF2-40B4-BE49-F238E27FC236}">
+                <a16:creationId xmlns:a16="http://schemas.microsoft.com/office/drawing/2014/main" id="{7E403DFB-6D6D-C1F4-847F-4DB60C28644C}"/>
+              </a:ext>
+            </a:extLst>
+          </p:cNvPr>
+          <p:cNvSpPr/>
+          <p:nvPr/>
+        </p:nvSpPr>
+        <p:spPr bwMode="auto">
+          <a:xfrm>
+            <a:off x="8737069" y="1217451"/>
+            <a:ext cx="2753034" cy="1047702"/>
+          </a:xfrm>
+          <a:prstGeom prst="wedgeRoundRectCallout">
+            <a:avLst>
+              <a:gd name="adj1" fmla="val -82379"/>
+              <a:gd name="adj2" fmla="val 13656"/>
+              <a:gd name="adj3" fmla="val 16667"/>
+            </a:avLst>
+          </a:prstGeom>
+          <a:solidFill>
+            <a:schemeClr val="dk2">
+              <a:alpha val="80000"/>
+            </a:schemeClr>
+          </a:solidFill>
+          <a:ln w="19050">
+            <a:solidFill>
+              <a:schemeClr val="tx1">
+                <a:lumMod val="75000"/>
+                <a:alpha val="80000"/>
+              </a:schemeClr>
+            </a:solidFill>
+          </a:ln>
+          <a:effectLst/>
+        </p:spPr>
+        <p:style>
+          <a:lnRef idx="2">
+            <a:schemeClr val="accent1">
+              <a:shade val="50000"/>
+            </a:schemeClr>
+          </a:lnRef>
+          <a:fillRef idx="1001">
+            <a:schemeClr val="dk2"/>
+          </a:fillRef>
+          <a:effectRef idx="0">
+            <a:schemeClr val="accent1"/>
+          </a:effectRef>
+          <a:fontRef idx="minor">
+            <a:schemeClr val="lt1"/>
+          </a:fontRef>
+        </p:style>
+        <p:txBody>
+          <a:bodyPr rot="0" spcFirstLastPara="0" vertOverflow="overflow" horzOverflow="overflow" vert="horz" wrap="square" lIns="91440" tIns="45720" rIns="91440" bIns="45720" numCol="1" spcCol="0" rtlCol="0" fromWordArt="0" anchor="ctr" anchorCtr="0" forceAA="0" compatLnSpc="1">
+            <a:prstTxWarp prst="textNoShape">
+              <a:avLst/>
+            </a:prstTxWarp>
+            <a:noAutofit/>
+          </a:bodyPr>
+          <a:lstStyle/>
+          <a:p>
+            <a:pPr algn="ctr"/>
+            <a:r>
+              <a:rPr lang="bg-BG" sz="2800" b="1" dirty="0">
+                <a:solidFill>
+                  <a:schemeClr val="bg1">
+                    <a:lumMod val="60000"/>
+                    <a:lumOff val="40000"/>
+                  </a:schemeClr>
+                </a:solidFill>
+                <a:effectLst>
+                  <a:outerShdw blurRad="38100" dist="38100" dir="2700000" algn="tl">
+                    <a:srgbClr val="000000">
+                      <a:alpha val="43137"/>
+                    </a:srgbClr>
+                  </a:outerShdw>
+                </a:effectLst>
+              </a:rPr>
+              <a:t>Затваряне</a:t>
+            </a:r>
+            <a:r>
+              <a:rPr lang="bg-BG" sz="2800" b="1" dirty="0">
+                <a:solidFill>
+                  <a:srgbClr val="FFFFFF"/>
+                </a:solidFill>
+                <a:effectLst>
+                  <a:outerShdw blurRad="38100" dist="38100" dir="2700000" algn="tl">
+                    <a:srgbClr val="000000">
+                      <a:alpha val="43137"/>
+                    </a:srgbClr>
+                  </a:outerShdw>
+                </a:effectLst>
+              </a:rPr>
+              <a:t> на прозореца</a:t>
+            </a:r>
+            <a:endParaRPr lang="bg-BG" sz="2800" b="1" dirty="0">
+              <a:solidFill>
+                <a:schemeClr val="bg1">
+                  <a:lumMod val="60000"/>
+                  <a:lumOff val="40000"/>
+                </a:schemeClr>
+              </a:solidFill>
+              <a:effectLst>
+                <a:outerShdw blurRad="38100" dist="38100" dir="2700000" algn="tl">
+                  <a:srgbClr val="000000">
+                    <a:alpha val="43137"/>
+                  </a:srgbClr>
+                </a:outerShdw>
+              </a:effectLst>
+            </a:endParaRPr>
+          </a:p>
+        </p:txBody>
+      </p:sp>
+      <p:sp>
+        <p:nvSpPr>
+          <p:cNvPr id="4" name="Rectangle 3">
+            <a:extLst>
+              <a:ext uri="{FF2B5EF4-FFF2-40B4-BE49-F238E27FC236}">
+                <a16:creationId xmlns:a16="http://schemas.microsoft.com/office/drawing/2014/main" id="{E4A5D7AE-5846-ECAC-F429-0546A1D46D64}"/>
+              </a:ext>
+            </a:extLst>
+          </p:cNvPr>
+          <p:cNvSpPr/>
+          <p:nvPr/>
+        </p:nvSpPr>
+        <p:spPr bwMode="auto">
+          <a:xfrm>
+            <a:off x="7273291" y="1741301"/>
+            <a:ext cx="545880" cy="363723"/>
+          </a:xfrm>
+          <a:prstGeom prst="rect">
+            <a:avLst/>
+          </a:prstGeom>
+          <a:noFill/>
+          <a:ln w="38100">
+            <a:solidFill>
+              <a:schemeClr val="tx1">
+                <a:lumMod val="75000"/>
+                <a:alpha val="80000"/>
+              </a:schemeClr>
+            </a:solidFill>
+          </a:ln>
+          <a:effectLst/>
+        </p:spPr>
+        <p:style>
+          <a:lnRef idx="2">
+            <a:schemeClr val="accent1">
+              <a:shade val="50000"/>
+            </a:schemeClr>
+          </a:lnRef>
+          <a:fillRef idx="1001">
+            <a:schemeClr val="dk2"/>
+          </a:fillRef>
+          <a:effectRef idx="0">
+            <a:schemeClr val="accent1"/>
+          </a:effectRef>
+          <a:fontRef idx="minor">
+            <a:schemeClr val="lt1"/>
+          </a:fontRef>
+        </p:style>
+        <p:txBody>
+          <a:bodyPr rot="0" spcFirstLastPara="0" vertOverflow="overflow" horzOverflow="overflow" vert="horz" wrap="square" lIns="91440" tIns="45720" rIns="91440" bIns="45720" numCol="1" spcCol="0" rtlCol="0" fromWordArt="0" anchor="ctr" anchorCtr="0" forceAA="0" compatLnSpc="1">
+            <a:prstTxWarp prst="textNoShape">
+              <a:avLst/>
+            </a:prstTxWarp>
+            <a:noAutofit/>
+          </a:bodyPr>
+          <a:lstStyle/>
+          <a:p>
+            <a:pPr algn="ctr"/>
+            <a:endParaRPr lang="en-US" sz="2800" b="1" dirty="0">
+              <a:solidFill>
+                <a:srgbClr val="FFFFFF"/>
+              </a:solidFill>
+              <a:effectLst>
+                <a:outerShdw blurRad="38100" dist="38100" dir="2700000" algn="tl">
+                  <a:srgbClr val="000000">
+                    <a:alpha val="43137"/>
+                  </a:srgbClr>
+                </a:outerShdw>
+              </a:effectLst>
+            </a:endParaRPr>
           </a:p>
         </p:txBody>
       </p:sp>
@@ -16582,6 +16817,96 @@
                       </p:childTnLst>
                     </p:cTn>
                   </p:par>
+                  <p:par>
+                    <p:cTn id="19" fill="hold">
+                      <p:stCondLst>
+                        <p:cond delay="indefinite"/>
+                      </p:stCondLst>
+                      <p:childTnLst>
+                        <p:par>
+                          <p:cTn id="20" fill="hold">
+                            <p:stCondLst>
+                              <p:cond delay="0"/>
+                            </p:stCondLst>
+                            <p:childTnLst>
+                              <p:par>
+                                <p:cTn id="21" presetID="1" presetClass="entr" presetSubtype="0" fill="hold" grpId="0" nodeType="clickEffect">
+                                  <p:stCondLst>
+                                    <p:cond delay="0"/>
+                                  </p:stCondLst>
+                                  <p:childTnLst>
+                                    <p:set>
+                                      <p:cBhvr>
+                                        <p:cTn id="22" dur="1" fill="hold">
+                                          <p:stCondLst>
+                                            <p:cond delay="0"/>
+                                          </p:stCondLst>
+                                        </p:cTn>
+                                        <p:tgtEl>
+                                          <p:spTgt spid="4"/>
+                                        </p:tgtEl>
+                                        <p:attrNameLst>
+                                          <p:attrName>style.visibility</p:attrName>
+                                        </p:attrNameLst>
+                                      </p:cBhvr>
+                                      <p:to>
+                                        <p:strVal val="visible"/>
+                                      </p:to>
+                                    </p:set>
+                                  </p:childTnLst>
+                                </p:cTn>
+                              </p:par>
+                            </p:childTnLst>
+                          </p:cTn>
+                        </p:par>
+                      </p:childTnLst>
+                    </p:cTn>
+                  </p:par>
+                  <p:par>
+                    <p:cTn id="23" fill="hold">
+                      <p:stCondLst>
+                        <p:cond delay="indefinite"/>
+                      </p:stCondLst>
+                      <p:childTnLst>
+                        <p:par>
+                          <p:cTn id="24" fill="hold">
+                            <p:stCondLst>
+                              <p:cond delay="0"/>
+                            </p:stCondLst>
+                            <p:childTnLst>
+                              <p:par>
+                                <p:cTn id="25" presetID="1" presetClass="entr" presetSubtype="0" fill="hold" grpId="0" nodeType="clickEffect">
+                                  <p:stCondLst>
+                                    <p:cond delay="0"/>
+                                  </p:stCondLst>
+                                  <p:childTnLst>
+                                    <p:set>
+                                      <p:cBhvr>
+                                        <p:cTn id="26" dur="1" fill="hold">
+                                          <p:stCondLst>
+                                            <p:cond delay="0"/>
+                                          </p:stCondLst>
+                                        </p:cTn>
+                                        <p:tgtEl>
+                                          <p:spTgt spid="2"/>
+                                        </p:tgtEl>
+                                        <p:attrNameLst>
+                                          <p:attrName>style.visibility</p:attrName>
+                                        </p:attrNameLst>
+                                      </p:cBhvr>
+                                      <p:to>
+                                        <p:strVal val="visible"/>
+                                      </p:to>
+                                    </p:set>
+                                  </p:childTnLst>
+                                </p:cTn>
+                              </p:par>
+                            </p:childTnLst>
+                          </p:cTn>
+                        </p:par>
+                      </p:childTnLst>
+                    </p:cTn>
+                  </p:par>
                 </p:childTnLst>
               </p:cTn>
               <p:prevCondLst>
@@ -16608,6 +16933,8 @@
       <p:bldP spid="21" grpId="0" animBg="1"/>
       <p:bldP spid="6" grpId="0" animBg="1"/>
       <p:bldP spid="10" grpId="0" animBg="1"/>
+      <p:bldP spid="2" grpId="0" animBg="1"/>
+      <p:bldP spid="4" grpId="0" animBg="1"/>
     </p:bldLst>
   </p:timing>
 </p:sld>

</xml_diff>